<commit_message>
updated the course material for CSCI 111 and CSCI 325
</commit_message>
<xml_diff>
--- a/CSCI-111/week-2/week-2-lecture-1/week-2-lecture-1.pptx
+++ b/CSCI-111/week-2/week-2-lecture-1/week-2-lecture-1.pptx
@@ -268,7 +268,7 @@
       </p15:sldGuideLst>
     </p:ext>
     <p:ext uri="GoogleSlidesCustomDataVersion2">
-      <go:slidesCustomData xmlns:go="http://customooxmlschemas.google.com/" r:id="rId18" roundtripDataSignature="AMtx7mg19nGc+0mtOaRMMMfBEg6L3+o/GQ=="/>
+      <go:slidesCustomData xmlns:go="http://customooxmlschemas.google.com/" r:id="rId18" roundtripDataSignature="AMtx7mi9FTgMwzFg/b1Mt9fKf+P8TAnmTA=="/>
     </p:ext>
   </p:extLst>
 </p:presentation>
@@ -957,7 +957,7 @@
   <p:cSld>
     <p:spTree>
       <p:nvGrpSpPr>
-        <p:cNvPr id="109" name="Shape 109"/>
+        <p:cNvPr id="113" name="Shape 113"/>
         <p:cNvGrpSpPr/>
         <p:nvPr/>
       </p:nvGrpSpPr>
@@ -971,7 +971,7 @@
       </p:grpSpPr>
       <p:sp>
         <p:nvSpPr>
-          <p:cNvPr id="110" name="Google Shape;110;p10:notes"/>
+          <p:cNvPr id="114" name="Google Shape;114;p10:notes"/>
           <p:cNvSpPr/>
           <p:nvPr>
             <p:ph idx="2" type="sldImg"/>
@@ -1016,7 +1016,7 @@
       </p:sp>
       <p:sp>
         <p:nvSpPr>
-          <p:cNvPr id="111" name="Google Shape;111;p10:notes"/>
+          <p:cNvPr id="115" name="Google Shape;115;p10:notes"/>
           <p:cNvSpPr txBox="1"/>
           <p:nvPr>
             <p:ph idx="1" type="body"/>
@@ -1074,7 +1074,7 @@
   <p:cSld>
     <p:spTree>
       <p:nvGrpSpPr>
-        <p:cNvPr id="115" name="Shape 115"/>
+        <p:cNvPr id="120" name="Shape 120"/>
         <p:cNvGrpSpPr/>
         <p:nvPr/>
       </p:nvGrpSpPr>
@@ -1088,7 +1088,7 @@
       </p:grpSpPr>
       <p:sp>
         <p:nvSpPr>
-          <p:cNvPr id="116" name="Google Shape;116;p11:notes"/>
+          <p:cNvPr id="121" name="Google Shape;121;p11:notes"/>
           <p:cNvSpPr/>
           <p:nvPr>
             <p:ph idx="2" type="sldImg"/>
@@ -1133,7 +1133,7 @@
       </p:sp>
       <p:sp>
         <p:nvSpPr>
-          <p:cNvPr id="117" name="Google Shape;117;p11:notes"/>
+          <p:cNvPr id="122" name="Google Shape;122;p11:notes"/>
           <p:cNvSpPr txBox="1"/>
           <p:nvPr>
             <p:ph idx="1" type="body"/>
@@ -1191,7 +1191,7 @@
   <p:cSld>
     <p:spTree>
       <p:nvGrpSpPr>
-        <p:cNvPr id="121" name="Shape 121"/>
+        <p:cNvPr id="127" name="Shape 127"/>
         <p:cNvGrpSpPr/>
         <p:nvPr/>
       </p:nvGrpSpPr>
@@ -1205,7 +1205,7 @@
       </p:grpSpPr>
       <p:sp>
         <p:nvSpPr>
-          <p:cNvPr id="122" name="Google Shape;122;p12:notes"/>
+          <p:cNvPr id="128" name="Google Shape;128;p12:notes"/>
           <p:cNvSpPr/>
           <p:nvPr>
             <p:ph idx="2" type="sldImg"/>
@@ -1250,7 +1250,7 @@
       </p:sp>
       <p:sp>
         <p:nvSpPr>
-          <p:cNvPr id="123" name="Google Shape;123;p12:notes"/>
+          <p:cNvPr id="129" name="Google Shape;129;p12:notes"/>
           <p:cNvSpPr txBox="1"/>
           <p:nvPr>
             <p:ph idx="1" type="body"/>
@@ -1893,7 +1893,7 @@
   <p:cSld>
     <p:spTree>
       <p:nvGrpSpPr>
-        <p:cNvPr id="90" name="Shape 90"/>
+        <p:cNvPr id="91" name="Shape 91"/>
         <p:cNvGrpSpPr/>
         <p:nvPr/>
       </p:nvGrpSpPr>
@@ -1907,7 +1907,7 @@
       </p:grpSpPr>
       <p:sp>
         <p:nvSpPr>
-          <p:cNvPr id="91" name="Google Shape;91;p7:notes"/>
+          <p:cNvPr id="92" name="Google Shape;92;p7:notes"/>
           <p:cNvSpPr/>
           <p:nvPr>
             <p:ph idx="2" type="sldImg"/>
@@ -1952,7 +1952,7 @@
       </p:sp>
       <p:sp>
         <p:nvSpPr>
-          <p:cNvPr id="92" name="Google Shape;92;p7:notes"/>
+          <p:cNvPr id="93" name="Google Shape;93;p7:notes"/>
           <p:cNvSpPr txBox="1"/>
           <p:nvPr>
             <p:ph idx="1" type="body"/>
@@ -2010,7 +2010,7 @@
   <p:cSld>
     <p:spTree>
       <p:nvGrpSpPr>
-        <p:cNvPr id="97" name="Shape 97"/>
+        <p:cNvPr id="99" name="Shape 99"/>
         <p:cNvGrpSpPr/>
         <p:nvPr/>
       </p:nvGrpSpPr>
@@ -2024,7 +2024,7 @@
       </p:grpSpPr>
       <p:sp>
         <p:nvSpPr>
-          <p:cNvPr id="98" name="Google Shape;98;p8:notes"/>
+          <p:cNvPr id="100" name="Google Shape;100;p8:notes"/>
           <p:cNvSpPr/>
           <p:nvPr>
             <p:ph idx="2" type="sldImg"/>
@@ -2069,7 +2069,7 @@
       </p:sp>
       <p:sp>
         <p:nvSpPr>
-          <p:cNvPr id="99" name="Google Shape;99;p8:notes"/>
+          <p:cNvPr id="101" name="Google Shape;101;p8:notes"/>
           <p:cNvSpPr txBox="1"/>
           <p:nvPr>
             <p:ph idx="1" type="body"/>
@@ -2127,7 +2127,7 @@
   <p:cSld>
     <p:spTree>
       <p:nvGrpSpPr>
-        <p:cNvPr id="103" name="Shape 103"/>
+        <p:cNvPr id="106" name="Shape 106"/>
         <p:cNvGrpSpPr/>
         <p:nvPr/>
       </p:nvGrpSpPr>
@@ -2141,7 +2141,7 @@
       </p:grpSpPr>
       <p:sp>
         <p:nvSpPr>
-          <p:cNvPr id="104" name="Google Shape;104;p9:notes"/>
+          <p:cNvPr id="107" name="Google Shape;107;p9:notes"/>
           <p:cNvSpPr/>
           <p:nvPr>
             <p:ph idx="2" type="sldImg"/>
@@ -2186,7 +2186,7 @@
       </p:sp>
       <p:sp>
         <p:nvSpPr>
-          <p:cNvPr id="105" name="Google Shape;105;p9:notes"/>
+          <p:cNvPr id="108" name="Google Shape;108;p9:notes"/>
           <p:cNvSpPr txBox="1"/>
           <p:nvPr>
             <p:ph idx="1" type="body"/>
@@ -10120,7 +10120,7 @@
   <p:cSld>
     <p:spTree>
       <p:nvGrpSpPr>
-        <p:cNvPr id="112" name="Shape 112"/>
+        <p:cNvPr id="116" name="Shape 116"/>
         <p:cNvGrpSpPr/>
         <p:nvPr/>
       </p:nvGrpSpPr>
@@ -10134,7 +10134,7 @@
       </p:grpSpPr>
       <p:sp>
         <p:nvSpPr>
-          <p:cNvPr id="113" name="Google Shape;113;p10"/>
+          <p:cNvPr id="117" name="Google Shape;117;p10"/>
           <p:cNvSpPr txBox="1"/>
           <p:nvPr>
             <p:ph type="title"/>
@@ -10182,7 +10182,7 @@
       </p:sp>
       <p:sp>
         <p:nvSpPr>
-          <p:cNvPr id="114" name="Google Shape;114;p10"/>
+          <p:cNvPr id="118" name="Google Shape;118;p10"/>
           <p:cNvSpPr txBox="1"/>
           <p:nvPr>
             <p:ph idx="1" type="body"/>
@@ -10572,6 +10572,76 @@
           </a:p>
         </p:txBody>
       </p:sp>
+      <p:sp>
+        <p:nvSpPr>
+          <p:cNvPr id="119" name="Google Shape;119;p10"/>
+          <p:cNvSpPr/>
+          <p:nvPr/>
+        </p:nvSpPr>
+        <p:spPr>
+          <a:xfrm>
+            <a:off x="7007500" y="4821150"/>
+            <a:ext cx="2136600" cy="322200"/>
+          </a:xfrm>
+          <a:prstGeom prst="rect">
+            <a:avLst/>
+          </a:prstGeom>
+          <a:noFill/>
+          <a:ln>
+            <a:noFill/>
+          </a:ln>
+        </p:spPr>
+        <p:txBody>
+          <a:bodyPr anchorCtr="0" anchor="ctr" bIns="91425" lIns="91425" spcFirstLastPara="1" rIns="91425" wrap="square" tIns="91425">
+            <a:noAutofit/>
+          </a:bodyPr>
+          <a:lstStyle/>
+          <a:p>
+            <a:pPr indent="0" lvl="0" marL="0" rtl="0" algn="ctr">
+              <a:spcBef>
+                <a:spcPts val="0"/>
+              </a:spcBef>
+              <a:spcAft>
+                <a:spcPts val="0"/>
+              </a:spcAft>
+              <a:buNone/>
+            </a:pPr>
+            <a:r>
+              <a:rPr lang="en">
+                <a:solidFill>
+                  <a:schemeClr val="dk1"/>
+                </a:solidFill>
+                <a:latin typeface="Courier New"/>
+                <a:ea typeface="Courier New"/>
+                <a:cs typeface="Courier New"/>
+                <a:sym typeface="Courier New"/>
+              </a:rPr>
+              <a:t>2</a:t>
+            </a:r>
+            <a:r>
+              <a:rPr lang="en">
+                <a:solidFill>
+                  <a:schemeClr val="dk1"/>
+                </a:solidFill>
+                <a:latin typeface="Courier New"/>
+                <a:ea typeface="Courier New"/>
+                <a:cs typeface="Courier New"/>
+                <a:sym typeface="Courier New"/>
+              </a:rPr>
+              <a:t>.html</a:t>
+            </a:r>
+            <a:endParaRPr>
+              <a:solidFill>
+                <a:schemeClr val="dk1"/>
+              </a:solidFill>
+              <a:latin typeface="Courier New"/>
+              <a:ea typeface="Courier New"/>
+              <a:cs typeface="Courier New"/>
+              <a:sym typeface="Courier New"/>
+            </a:endParaRPr>
+          </a:p>
+        </p:txBody>
+      </p:sp>
     </p:spTree>
   </p:cSld>
   <p:clrMapOvr>
@@ -10585,7 +10655,7 @@
   <p:cSld>
     <p:spTree>
       <p:nvGrpSpPr>
-        <p:cNvPr id="118" name="Shape 118"/>
+        <p:cNvPr id="123" name="Shape 123"/>
         <p:cNvGrpSpPr/>
         <p:nvPr/>
       </p:nvGrpSpPr>
@@ -10599,7 +10669,7 @@
       </p:grpSpPr>
       <p:sp>
         <p:nvSpPr>
-          <p:cNvPr id="119" name="Google Shape;119;p11"/>
+          <p:cNvPr id="124" name="Google Shape;124;p11"/>
           <p:cNvSpPr txBox="1"/>
           <p:nvPr>
             <p:ph type="title"/>
@@ -10647,7 +10717,7 @@
       </p:sp>
       <p:sp>
         <p:nvSpPr>
-          <p:cNvPr id="120" name="Google Shape;120;p11"/>
+          <p:cNvPr id="125" name="Google Shape;125;p11"/>
           <p:cNvSpPr txBox="1"/>
           <p:nvPr>
             <p:ph idx="1" type="body"/>
@@ -10997,6 +11067,76 @@
           </a:p>
         </p:txBody>
       </p:sp>
+      <p:sp>
+        <p:nvSpPr>
+          <p:cNvPr id="126" name="Google Shape;126;p11"/>
+          <p:cNvSpPr/>
+          <p:nvPr/>
+        </p:nvSpPr>
+        <p:spPr>
+          <a:xfrm>
+            <a:off x="7007500" y="4821150"/>
+            <a:ext cx="2136600" cy="322200"/>
+          </a:xfrm>
+          <a:prstGeom prst="rect">
+            <a:avLst/>
+          </a:prstGeom>
+          <a:noFill/>
+          <a:ln>
+            <a:noFill/>
+          </a:ln>
+        </p:spPr>
+        <p:txBody>
+          <a:bodyPr anchorCtr="0" anchor="ctr" bIns="91425" lIns="91425" spcFirstLastPara="1" rIns="91425" wrap="square" tIns="91425">
+            <a:noAutofit/>
+          </a:bodyPr>
+          <a:lstStyle/>
+          <a:p>
+            <a:pPr indent="0" lvl="0" marL="0" rtl="0" algn="ctr">
+              <a:spcBef>
+                <a:spcPts val="0"/>
+              </a:spcBef>
+              <a:spcAft>
+                <a:spcPts val="0"/>
+              </a:spcAft>
+              <a:buNone/>
+            </a:pPr>
+            <a:r>
+              <a:rPr lang="en">
+                <a:solidFill>
+                  <a:schemeClr val="dk1"/>
+                </a:solidFill>
+                <a:latin typeface="Courier New"/>
+                <a:ea typeface="Courier New"/>
+                <a:cs typeface="Courier New"/>
+                <a:sym typeface="Courier New"/>
+              </a:rPr>
+              <a:t>2</a:t>
+            </a:r>
+            <a:r>
+              <a:rPr lang="en">
+                <a:solidFill>
+                  <a:schemeClr val="dk1"/>
+                </a:solidFill>
+                <a:latin typeface="Courier New"/>
+                <a:ea typeface="Courier New"/>
+                <a:cs typeface="Courier New"/>
+                <a:sym typeface="Courier New"/>
+              </a:rPr>
+              <a:t>.html</a:t>
+            </a:r>
+            <a:endParaRPr>
+              <a:solidFill>
+                <a:schemeClr val="dk1"/>
+              </a:solidFill>
+              <a:latin typeface="Courier New"/>
+              <a:ea typeface="Courier New"/>
+              <a:cs typeface="Courier New"/>
+              <a:sym typeface="Courier New"/>
+            </a:endParaRPr>
+          </a:p>
+        </p:txBody>
+      </p:sp>
     </p:spTree>
   </p:cSld>
   <p:clrMapOvr>
@@ -11010,7 +11150,7 @@
   <p:cSld>
     <p:spTree>
       <p:nvGrpSpPr>
-        <p:cNvPr id="124" name="Shape 124"/>
+        <p:cNvPr id="130" name="Shape 130"/>
         <p:cNvGrpSpPr/>
         <p:nvPr/>
       </p:nvGrpSpPr>
@@ -11024,7 +11164,7 @@
       </p:grpSpPr>
       <p:sp>
         <p:nvSpPr>
-          <p:cNvPr id="125" name="Google Shape;125;p12"/>
+          <p:cNvPr id="131" name="Google Shape;131;p12"/>
           <p:cNvSpPr txBox="1"/>
           <p:nvPr>
             <p:ph type="title"/>
@@ -11072,7 +11212,7 @@
       </p:sp>
       <p:sp>
         <p:nvSpPr>
-          <p:cNvPr id="126" name="Google Shape;126;p12"/>
+          <p:cNvPr id="132" name="Google Shape;132;p12"/>
           <p:cNvSpPr txBox="1"/>
           <p:nvPr>
             <p:ph idx="1" type="body"/>
@@ -12424,7 +12564,7 @@
                   <a:srgbClr val="FF0000"/>
                 </a:solidFill>
               </a:rPr>
-              <a:t>h1, div, p, ul, ol, a*</a:t>
+              <a:t>h1, div, p, ul, ol</a:t>
             </a:r>
             <a:endParaRPr>
               <a:solidFill>
@@ -12749,18 +12889,6 @@
                 <a:sym typeface="Arial"/>
               </a:rPr>
               <a:t>span, strong, a</a:t>
-            </a:r>
-            <a:r>
-              <a:rPr b="0" i="0" lang="en" sz="1800" u="none" cap="none" strike="noStrike">
-                <a:solidFill>
-                  <a:schemeClr val="dk1"/>
-                </a:solidFill>
-                <a:latin typeface="Arial"/>
-                <a:ea typeface="Arial"/>
-                <a:cs typeface="Arial"/>
-                <a:sym typeface="Arial"/>
-              </a:rPr>
-              <a:t>*</a:t>
             </a:r>
             <a:endParaRPr b="0" i="0" sz="1800" u="none" cap="none" strike="noStrike">
               <a:solidFill>
@@ -13427,6 +13555,64 @@
           </a:p>
         </p:txBody>
       </p:sp>
+      <p:sp>
+        <p:nvSpPr>
+          <p:cNvPr id="90" name="Google Shape;90;p6"/>
+          <p:cNvSpPr/>
+          <p:nvPr/>
+        </p:nvSpPr>
+        <p:spPr>
+          <a:xfrm>
+            <a:off x="7007500" y="4821150"/>
+            <a:ext cx="2136600" cy="322200"/>
+          </a:xfrm>
+          <a:prstGeom prst="rect">
+            <a:avLst/>
+          </a:prstGeom>
+          <a:noFill/>
+          <a:ln>
+            <a:noFill/>
+          </a:ln>
+        </p:spPr>
+        <p:txBody>
+          <a:bodyPr anchorCtr="0" anchor="ctr" bIns="91425" lIns="91425" spcFirstLastPara="1" rIns="91425" wrap="square" tIns="91425">
+            <a:noAutofit/>
+          </a:bodyPr>
+          <a:lstStyle/>
+          <a:p>
+            <a:pPr indent="0" lvl="0" marL="0" rtl="0" algn="ctr">
+              <a:spcBef>
+                <a:spcPts val="0"/>
+              </a:spcBef>
+              <a:spcAft>
+                <a:spcPts val="0"/>
+              </a:spcAft>
+              <a:buNone/>
+            </a:pPr>
+            <a:r>
+              <a:rPr lang="en">
+                <a:solidFill>
+                  <a:schemeClr val="dk1"/>
+                </a:solidFill>
+                <a:latin typeface="Courier New"/>
+                <a:ea typeface="Courier New"/>
+                <a:cs typeface="Courier New"/>
+                <a:sym typeface="Courier New"/>
+              </a:rPr>
+              <a:t>1.html</a:t>
+            </a:r>
+            <a:endParaRPr>
+              <a:solidFill>
+                <a:schemeClr val="dk1"/>
+              </a:solidFill>
+              <a:latin typeface="Courier New"/>
+              <a:ea typeface="Courier New"/>
+              <a:cs typeface="Courier New"/>
+              <a:sym typeface="Courier New"/>
+            </a:endParaRPr>
+          </a:p>
+        </p:txBody>
+      </p:sp>
     </p:spTree>
   </p:cSld>
   <p:clrMapOvr>
@@ -13440,7 +13626,7 @@
   <p:cSld>
     <p:spTree>
       <p:nvGrpSpPr>
-        <p:cNvPr id="93" name="Shape 93"/>
+        <p:cNvPr id="94" name="Shape 94"/>
         <p:cNvGrpSpPr/>
         <p:nvPr/>
       </p:nvGrpSpPr>
@@ -13454,7 +13640,7 @@
       </p:grpSpPr>
       <p:sp>
         <p:nvSpPr>
-          <p:cNvPr id="94" name="Google Shape;94;p7"/>
+          <p:cNvPr id="95" name="Google Shape;95;p7"/>
           <p:cNvSpPr txBox="1"/>
           <p:nvPr>
             <p:ph type="title"/>
@@ -13502,7 +13688,7 @@
       </p:sp>
       <p:sp>
         <p:nvSpPr>
-          <p:cNvPr id="95" name="Google Shape;95;p7"/>
+          <p:cNvPr id="96" name="Google Shape;96;p7"/>
           <p:cNvSpPr txBox="1"/>
           <p:nvPr>
             <p:ph idx="1" type="body"/>
@@ -13690,7 +13876,7 @@
       </p:sp>
       <p:sp>
         <p:nvSpPr>
-          <p:cNvPr id="96" name="Google Shape;96;p7"/>
+          <p:cNvPr id="97" name="Google Shape;97;p7"/>
           <p:cNvSpPr txBox="1"/>
           <p:nvPr>
             <p:ph idx="1" type="body"/>
@@ -13904,6 +14090,64 @@
           </a:p>
         </p:txBody>
       </p:sp>
+      <p:sp>
+        <p:nvSpPr>
+          <p:cNvPr id="98" name="Google Shape;98;p7"/>
+          <p:cNvSpPr/>
+          <p:nvPr/>
+        </p:nvSpPr>
+        <p:spPr>
+          <a:xfrm>
+            <a:off x="7007500" y="4821150"/>
+            <a:ext cx="2136600" cy="322200"/>
+          </a:xfrm>
+          <a:prstGeom prst="rect">
+            <a:avLst/>
+          </a:prstGeom>
+          <a:noFill/>
+          <a:ln>
+            <a:noFill/>
+          </a:ln>
+        </p:spPr>
+        <p:txBody>
+          <a:bodyPr anchorCtr="0" anchor="ctr" bIns="91425" lIns="91425" spcFirstLastPara="1" rIns="91425" wrap="square" tIns="91425">
+            <a:noAutofit/>
+          </a:bodyPr>
+          <a:lstStyle/>
+          <a:p>
+            <a:pPr indent="0" lvl="0" marL="0" rtl="0" algn="ctr">
+              <a:spcBef>
+                <a:spcPts val="0"/>
+              </a:spcBef>
+              <a:spcAft>
+                <a:spcPts val="0"/>
+              </a:spcAft>
+              <a:buNone/>
+            </a:pPr>
+            <a:r>
+              <a:rPr lang="en">
+                <a:solidFill>
+                  <a:schemeClr val="dk1"/>
+                </a:solidFill>
+                <a:latin typeface="Courier New"/>
+                <a:ea typeface="Courier New"/>
+                <a:cs typeface="Courier New"/>
+                <a:sym typeface="Courier New"/>
+              </a:rPr>
+              <a:t>1.html</a:t>
+            </a:r>
+            <a:endParaRPr>
+              <a:solidFill>
+                <a:schemeClr val="dk1"/>
+              </a:solidFill>
+              <a:latin typeface="Courier New"/>
+              <a:ea typeface="Courier New"/>
+              <a:cs typeface="Courier New"/>
+              <a:sym typeface="Courier New"/>
+            </a:endParaRPr>
+          </a:p>
+        </p:txBody>
+      </p:sp>
     </p:spTree>
   </p:cSld>
   <p:clrMapOvr>
@@ -13917,7 +14161,7 @@
   <p:cSld>
     <p:spTree>
       <p:nvGrpSpPr>
-        <p:cNvPr id="100" name="Shape 100"/>
+        <p:cNvPr id="102" name="Shape 102"/>
         <p:cNvGrpSpPr/>
         <p:nvPr/>
       </p:nvGrpSpPr>
@@ -13931,7 +14175,7 @@
       </p:grpSpPr>
       <p:sp>
         <p:nvSpPr>
-          <p:cNvPr id="101" name="Google Shape;101;p8"/>
+          <p:cNvPr id="103" name="Google Shape;103;p8"/>
           <p:cNvSpPr txBox="1"/>
           <p:nvPr>
             <p:ph type="title"/>
@@ -13979,7 +14223,7 @@
       </p:sp>
       <p:sp>
         <p:nvSpPr>
-          <p:cNvPr id="102" name="Google Shape;102;p8"/>
+          <p:cNvPr id="104" name="Google Shape;104;p8"/>
           <p:cNvSpPr txBox="1"/>
           <p:nvPr>
             <p:ph idx="1" type="body"/>
@@ -14257,6 +14501,64 @@
           </a:p>
         </p:txBody>
       </p:sp>
+      <p:sp>
+        <p:nvSpPr>
+          <p:cNvPr id="105" name="Google Shape;105;p8"/>
+          <p:cNvSpPr/>
+          <p:nvPr/>
+        </p:nvSpPr>
+        <p:spPr>
+          <a:xfrm>
+            <a:off x="7007500" y="4821150"/>
+            <a:ext cx="2136600" cy="322200"/>
+          </a:xfrm>
+          <a:prstGeom prst="rect">
+            <a:avLst/>
+          </a:prstGeom>
+          <a:noFill/>
+          <a:ln>
+            <a:noFill/>
+          </a:ln>
+        </p:spPr>
+        <p:txBody>
+          <a:bodyPr anchorCtr="0" anchor="ctr" bIns="91425" lIns="91425" spcFirstLastPara="1" rIns="91425" wrap="square" tIns="91425">
+            <a:noAutofit/>
+          </a:bodyPr>
+          <a:lstStyle/>
+          <a:p>
+            <a:pPr indent="0" lvl="0" marL="0" rtl="0" algn="ctr">
+              <a:spcBef>
+                <a:spcPts val="0"/>
+              </a:spcBef>
+              <a:spcAft>
+                <a:spcPts val="0"/>
+              </a:spcAft>
+              <a:buNone/>
+            </a:pPr>
+            <a:r>
+              <a:rPr lang="en">
+                <a:solidFill>
+                  <a:schemeClr val="dk1"/>
+                </a:solidFill>
+                <a:latin typeface="Courier New"/>
+                <a:ea typeface="Courier New"/>
+                <a:cs typeface="Courier New"/>
+                <a:sym typeface="Courier New"/>
+              </a:rPr>
+              <a:t>1.html</a:t>
+            </a:r>
+            <a:endParaRPr>
+              <a:solidFill>
+                <a:schemeClr val="dk1"/>
+              </a:solidFill>
+              <a:latin typeface="Courier New"/>
+              <a:ea typeface="Courier New"/>
+              <a:cs typeface="Courier New"/>
+              <a:sym typeface="Courier New"/>
+            </a:endParaRPr>
+          </a:p>
+        </p:txBody>
+      </p:sp>
     </p:spTree>
   </p:cSld>
   <p:clrMapOvr>
@@ -14270,7 +14572,7 @@
   <p:cSld>
     <p:spTree>
       <p:nvGrpSpPr>
-        <p:cNvPr id="106" name="Shape 106"/>
+        <p:cNvPr id="109" name="Shape 109"/>
         <p:cNvGrpSpPr/>
         <p:nvPr/>
       </p:nvGrpSpPr>
@@ -14284,7 +14586,7 @@
       </p:grpSpPr>
       <p:sp>
         <p:nvSpPr>
-          <p:cNvPr id="107" name="Google Shape;107;p9"/>
+          <p:cNvPr id="110" name="Google Shape;110;p9"/>
           <p:cNvSpPr txBox="1"/>
           <p:nvPr>
             <p:ph type="title"/>
@@ -14332,7 +14634,7 @@
       </p:sp>
       <p:sp>
         <p:nvSpPr>
-          <p:cNvPr id="108" name="Google Shape;108;p9"/>
+          <p:cNvPr id="111" name="Google Shape;111;p9"/>
           <p:cNvSpPr txBox="1"/>
           <p:nvPr>
             <p:ph idx="1" type="body"/>
@@ -14884,6 +15186,64 @@
           </a:p>
         </p:txBody>
       </p:sp>
+      <p:sp>
+        <p:nvSpPr>
+          <p:cNvPr id="112" name="Google Shape;112;p9"/>
+          <p:cNvSpPr/>
+          <p:nvPr/>
+        </p:nvSpPr>
+        <p:spPr>
+          <a:xfrm>
+            <a:off x="7007500" y="4821150"/>
+            <a:ext cx="2136600" cy="322200"/>
+          </a:xfrm>
+          <a:prstGeom prst="rect">
+            <a:avLst/>
+          </a:prstGeom>
+          <a:noFill/>
+          <a:ln>
+            <a:noFill/>
+          </a:ln>
+        </p:spPr>
+        <p:txBody>
+          <a:bodyPr anchorCtr="0" anchor="ctr" bIns="91425" lIns="91425" spcFirstLastPara="1" rIns="91425" wrap="square" tIns="91425">
+            <a:noAutofit/>
+          </a:bodyPr>
+          <a:lstStyle/>
+          <a:p>
+            <a:pPr indent="0" lvl="0" marL="0" rtl="0" algn="ctr">
+              <a:spcBef>
+                <a:spcPts val="0"/>
+              </a:spcBef>
+              <a:spcAft>
+                <a:spcPts val="0"/>
+              </a:spcAft>
+              <a:buNone/>
+            </a:pPr>
+            <a:r>
+              <a:rPr lang="en">
+                <a:solidFill>
+                  <a:schemeClr val="dk1"/>
+                </a:solidFill>
+                <a:latin typeface="Courier New"/>
+                <a:ea typeface="Courier New"/>
+                <a:cs typeface="Courier New"/>
+                <a:sym typeface="Courier New"/>
+              </a:rPr>
+              <a:t>1.html</a:t>
+            </a:r>
+            <a:endParaRPr>
+              <a:solidFill>
+                <a:schemeClr val="dk1"/>
+              </a:solidFill>
+              <a:latin typeface="Courier New"/>
+              <a:ea typeface="Courier New"/>
+              <a:cs typeface="Courier New"/>
+              <a:sym typeface="Courier New"/>
+            </a:endParaRPr>
+          </a:p>
+        </p:txBody>
+      </p:sp>
     </p:spTree>
   </p:cSld>
   <p:clrMapOvr>
@@ -14893,6 +15253,285 @@
 </file>
 
 <file path=ppt/theme/theme1.xml><?xml version="1.0" encoding="utf-8"?>
+<a:theme xmlns:a="http://schemas.openxmlformats.org/drawingml/2006/main" xmlns:r="http://schemas.openxmlformats.org/officeDocument/2006/relationships" name="Simple Light">
+  <a:themeElements>
+    <a:clrScheme name="Simple Light">
+      <a:dk1>
+        <a:srgbClr val="000000"/>
+      </a:dk1>
+      <a:lt1>
+        <a:srgbClr val="FFFFFF"/>
+      </a:lt1>
+      <a:dk2>
+        <a:srgbClr val="595959"/>
+      </a:dk2>
+      <a:lt2>
+        <a:srgbClr val="EEEEEE"/>
+      </a:lt2>
+      <a:accent1>
+        <a:srgbClr val="4285F4"/>
+      </a:accent1>
+      <a:accent2>
+        <a:srgbClr val="212121"/>
+      </a:accent2>
+      <a:accent3>
+        <a:srgbClr val="78909C"/>
+      </a:accent3>
+      <a:accent4>
+        <a:srgbClr val="FFAB40"/>
+      </a:accent4>
+      <a:accent5>
+        <a:srgbClr val="0097A7"/>
+      </a:accent5>
+      <a:accent6>
+        <a:srgbClr val="EEFF41"/>
+      </a:accent6>
+      <a:hlink>
+        <a:srgbClr val="0097A7"/>
+      </a:hlink>
+      <a:folHlink>
+        <a:srgbClr val="0097A7"/>
+      </a:folHlink>
+    </a:clrScheme>
+    <a:fontScheme name="Office">
+      <a:majorFont>
+        <a:latin typeface="Arial"/>
+        <a:ea typeface=""/>
+        <a:cs typeface=""/>
+        <a:font script="Jpan" typeface="ＭＳ Ｐゴシック"/>
+        <a:font script="Hang" typeface="맑은 고딕"/>
+        <a:font script="Hans" typeface="宋体"/>
+        <a:font script="Hant" typeface="新細明體"/>
+        <a:font script="Arab" typeface="Times New Roman"/>
+        <a:font script="Hebr" typeface="Times New Roman"/>
+        <a:font script="Thai" typeface="Angsana New"/>
+        <a:font script="Ethi" typeface="Nyala"/>
+        <a:font script="Beng" typeface="Vrinda"/>
+        <a:font script="Gujr" typeface="Shruti"/>
+        <a:font script="Khmr" typeface="MoolBoran"/>
+        <a:font script="Knda" typeface="Tunga"/>
+        <a:font script="Guru" typeface="Raavi"/>
+        <a:font script="Cans" typeface="Euphemia"/>
+        <a:font script="Cher" typeface="Plantagenet Cherokee"/>
+        <a:font script="Yiii" typeface="Microsoft Yi Baiti"/>
+        <a:font script="Tibt" typeface="Microsoft Himalaya"/>
+        <a:font script="Thaa" typeface="MV Boli"/>
+        <a:font script="Deva" typeface="Mangal"/>
+        <a:font script="Telu" typeface="Gautami"/>
+        <a:font script="Taml" typeface="Latha"/>
+        <a:font script="Syrc" typeface="Estrangelo Edessa"/>
+        <a:font script="Orya" typeface="Kalinga"/>
+        <a:font script="Mlym" typeface="Kartika"/>
+        <a:font script="Laoo" typeface="DokChampa"/>
+        <a:font script="Sinh" typeface="Iskoola Pota"/>
+        <a:font script="Mong" typeface="Mongolian Baiti"/>
+        <a:font script="Viet" typeface="Times New Roman"/>
+        <a:font script="Uigh" typeface="Microsoft Uighur"/>
+        <a:font script="Geor" typeface="Sylfaen"/>
+      </a:majorFont>
+      <a:minorFont>
+        <a:latin typeface="Arial"/>
+        <a:ea typeface=""/>
+        <a:cs typeface=""/>
+        <a:font script="Jpan" typeface="ＭＳ Ｐゴシック"/>
+        <a:font script="Hang" typeface="맑은 고딕"/>
+        <a:font script="Hans" typeface="宋体"/>
+        <a:font script="Hant" typeface="新細明體"/>
+        <a:font script="Arab" typeface="Arial"/>
+        <a:font script="Hebr" typeface="Arial"/>
+        <a:font script="Thai" typeface="Cordia New"/>
+        <a:font script="Ethi" typeface="Nyala"/>
+        <a:font script="Beng" typeface="Vrinda"/>
+        <a:font script="Gujr" typeface="Shruti"/>
+        <a:font script="Khmr" typeface="DaunPenh"/>
+        <a:font script="Knda" typeface="Tunga"/>
+        <a:font script="Guru" typeface="Raavi"/>
+        <a:font script="Cans" typeface="Euphemia"/>
+        <a:font script="Cher" typeface="Plantagenet Cherokee"/>
+        <a:font script="Yiii" typeface="Microsoft Yi Baiti"/>
+        <a:font script="Tibt" typeface="Microsoft Himalaya"/>
+        <a:font script="Thaa" typeface="MV Boli"/>
+        <a:font script="Deva" typeface="Mangal"/>
+        <a:font script="Telu" typeface="Gautami"/>
+        <a:font script="Taml" typeface="Latha"/>
+        <a:font script="Syrc" typeface="Estrangelo Edessa"/>
+        <a:font script="Orya" typeface="Kalinga"/>
+        <a:font script="Mlym" typeface="Kartika"/>
+        <a:font script="Laoo" typeface="DokChampa"/>
+        <a:font script="Sinh" typeface="Iskoola Pota"/>
+        <a:font script="Mong" typeface="Mongolian Baiti"/>
+        <a:font script="Viet" typeface="Arial"/>
+        <a:font script="Uigh" typeface="Microsoft Uighur"/>
+        <a:font script="Geor" typeface="Sylfaen"/>
+      </a:minorFont>
+    </a:fontScheme>
+    <a:fmtScheme name="Office">
+      <a:fillStyleLst>
+        <a:solidFill>
+          <a:schemeClr val="phClr"/>
+        </a:solidFill>
+        <a:gradFill rotWithShape="1">
+          <a:gsLst>
+            <a:gs pos="0">
+              <a:schemeClr val="phClr">
+                <a:tint val="50000"/>
+                <a:satMod val="300000"/>
+              </a:schemeClr>
+            </a:gs>
+            <a:gs pos="35000">
+              <a:schemeClr val="phClr">
+                <a:tint val="37000"/>
+                <a:satMod val="300000"/>
+              </a:schemeClr>
+            </a:gs>
+            <a:gs pos="100000">
+              <a:schemeClr val="phClr">
+                <a:tint val="15000"/>
+                <a:satMod val="350000"/>
+              </a:schemeClr>
+            </a:gs>
+          </a:gsLst>
+          <a:lin ang="16200000" scaled="1"/>
+        </a:gradFill>
+        <a:gradFill rotWithShape="1">
+          <a:gsLst>
+            <a:gs pos="0">
+              <a:schemeClr val="phClr">
+                <a:tint val="100000"/>
+                <a:shade val="100000"/>
+                <a:satMod val="130000"/>
+              </a:schemeClr>
+            </a:gs>
+            <a:gs pos="100000">
+              <a:schemeClr val="phClr">
+                <a:tint val="50000"/>
+                <a:shade val="100000"/>
+                <a:satMod val="350000"/>
+              </a:schemeClr>
+            </a:gs>
+          </a:gsLst>
+          <a:lin ang="16200000" scaled="0"/>
+        </a:gradFill>
+      </a:fillStyleLst>
+      <a:lnStyleLst>
+        <a:ln w="9525" cap="flat" cmpd="sng" algn="ctr">
+          <a:solidFill>
+            <a:schemeClr val="phClr">
+              <a:shade val="95000"/>
+              <a:satMod val="105000"/>
+            </a:schemeClr>
+          </a:solidFill>
+          <a:prstDash val="solid"/>
+        </a:ln>
+        <a:ln w="25400" cap="flat" cmpd="sng" algn="ctr">
+          <a:solidFill>
+            <a:schemeClr val="phClr"/>
+          </a:solidFill>
+          <a:prstDash val="solid"/>
+        </a:ln>
+        <a:ln w="38100" cap="flat" cmpd="sng" algn="ctr">
+          <a:solidFill>
+            <a:schemeClr val="phClr"/>
+          </a:solidFill>
+          <a:prstDash val="solid"/>
+        </a:ln>
+      </a:lnStyleLst>
+      <a:effectStyleLst>
+        <a:effectStyle>
+          <a:effectLst>
+            <a:outerShdw blurRad="40000" dist="20000" dir="5400000" rotWithShape="0">
+              <a:srgbClr val="000000">
+                <a:alpha val="38000"/>
+              </a:srgbClr>
+            </a:outerShdw>
+          </a:effectLst>
+        </a:effectStyle>
+        <a:effectStyle>
+          <a:effectLst>
+            <a:outerShdw blurRad="40000" dist="23000" dir="5400000" rotWithShape="0">
+              <a:srgbClr val="000000">
+                <a:alpha val="35000"/>
+              </a:srgbClr>
+            </a:outerShdw>
+          </a:effectLst>
+        </a:effectStyle>
+        <a:effectStyle>
+          <a:effectLst>
+            <a:outerShdw blurRad="40000" dist="23000" dir="5400000" rotWithShape="0">
+              <a:srgbClr val="000000">
+                <a:alpha val="35000"/>
+              </a:srgbClr>
+            </a:outerShdw>
+          </a:effectLst>
+          <a:scene3d>
+            <a:camera prst="orthographicFront">
+              <a:rot lat="0" lon="0" rev="0"/>
+            </a:camera>
+            <a:lightRig rig="threePt" dir="t">
+              <a:rot lat="0" lon="0" rev="1200000"/>
+            </a:lightRig>
+          </a:scene3d>
+          <a:sp3d>
+            <a:bevelT w="63500" h="25400"/>
+          </a:sp3d>
+        </a:effectStyle>
+      </a:effectStyleLst>
+      <a:bgFillStyleLst>
+        <a:solidFill>
+          <a:schemeClr val="phClr"/>
+        </a:solidFill>
+        <a:gradFill rotWithShape="1">
+          <a:gsLst>
+            <a:gs pos="0">
+              <a:schemeClr val="phClr">
+                <a:tint val="40000"/>
+                <a:satMod val="350000"/>
+              </a:schemeClr>
+            </a:gs>
+            <a:gs pos="40000">
+              <a:schemeClr val="phClr">
+                <a:tint val="45000"/>
+                <a:shade val="99000"/>
+                <a:satMod val="350000"/>
+              </a:schemeClr>
+            </a:gs>
+            <a:gs pos="100000">
+              <a:schemeClr val="phClr">
+                <a:shade val="20000"/>
+                <a:satMod val="255000"/>
+              </a:schemeClr>
+            </a:gs>
+          </a:gsLst>
+          <a:path path="circle">
+            <a:fillToRect l="50000" t="-80000" r="50000" b="180000"/>
+          </a:path>
+        </a:gradFill>
+        <a:gradFill rotWithShape="1">
+          <a:gsLst>
+            <a:gs pos="0">
+              <a:schemeClr val="phClr">
+                <a:tint val="80000"/>
+                <a:satMod val="300000"/>
+              </a:schemeClr>
+            </a:gs>
+            <a:gs pos="100000">
+              <a:schemeClr val="phClr">
+                <a:shade val="30000"/>
+                <a:satMod val="200000"/>
+              </a:schemeClr>
+            </a:gs>
+          </a:gsLst>
+          <a:path path="circle">
+            <a:fillToRect l="50000" t="50000" r="50000" b="50000"/>
+          </a:path>
+        </a:gradFill>
+      </a:bgFillStyleLst>
+    </a:fmtScheme>
+  </a:themeElements>
+</a:theme>
+</file>
+
+<file path=ppt/theme/theme2.xml><?xml version="1.0" encoding="utf-8"?>
 <a:theme xmlns:a="http://schemas.openxmlformats.org/drawingml/2006/main" xmlns:r="http://schemas.openxmlformats.org/officeDocument/2006/relationships">
   <a:themeElements>
     <a:clrScheme name="Default">
@@ -15169,283 +15808,4 @@
     </a:fmtScheme>
   </a:themeElements>
 </a:theme>
-</file>
-
-<file path=ppt/theme/theme2.xml><?xml version="1.0" encoding="utf-8"?>
-<a:theme xmlns:a="http://schemas.openxmlformats.org/drawingml/2006/main" xmlns:r="http://schemas.openxmlformats.org/officeDocument/2006/relationships" name="Simple Light">
-  <a:themeElements>
-    <a:clrScheme name="Simple Light">
-      <a:dk1>
-        <a:srgbClr val="000000"/>
-      </a:dk1>
-      <a:lt1>
-        <a:srgbClr val="FFFFFF"/>
-      </a:lt1>
-      <a:dk2>
-        <a:srgbClr val="595959"/>
-      </a:dk2>
-      <a:lt2>
-        <a:srgbClr val="EEEEEE"/>
-      </a:lt2>
-      <a:accent1>
-        <a:srgbClr val="4285F4"/>
-      </a:accent1>
-      <a:accent2>
-        <a:srgbClr val="212121"/>
-      </a:accent2>
-      <a:accent3>
-        <a:srgbClr val="78909C"/>
-      </a:accent3>
-      <a:accent4>
-        <a:srgbClr val="FFAB40"/>
-      </a:accent4>
-      <a:accent5>
-        <a:srgbClr val="0097A7"/>
-      </a:accent5>
-      <a:accent6>
-        <a:srgbClr val="EEFF41"/>
-      </a:accent6>
-      <a:hlink>
-        <a:srgbClr val="0097A7"/>
-      </a:hlink>
-      <a:folHlink>
-        <a:srgbClr val="0097A7"/>
-      </a:folHlink>
-    </a:clrScheme>
-    <a:fontScheme name="Office">
-      <a:majorFont>
-        <a:latin typeface="Arial"/>
-        <a:ea typeface=""/>
-        <a:cs typeface=""/>
-        <a:font script="Jpan" typeface="ＭＳ Ｐゴシック"/>
-        <a:font script="Hang" typeface="맑은 고딕"/>
-        <a:font script="Hans" typeface="宋体"/>
-        <a:font script="Hant" typeface="新細明體"/>
-        <a:font script="Arab" typeface="Times New Roman"/>
-        <a:font script="Hebr" typeface="Times New Roman"/>
-        <a:font script="Thai" typeface="Angsana New"/>
-        <a:font script="Ethi" typeface="Nyala"/>
-        <a:font script="Beng" typeface="Vrinda"/>
-        <a:font script="Gujr" typeface="Shruti"/>
-        <a:font script="Khmr" typeface="MoolBoran"/>
-        <a:font script="Knda" typeface="Tunga"/>
-        <a:font script="Guru" typeface="Raavi"/>
-        <a:font script="Cans" typeface="Euphemia"/>
-        <a:font script="Cher" typeface="Plantagenet Cherokee"/>
-        <a:font script="Yiii" typeface="Microsoft Yi Baiti"/>
-        <a:font script="Tibt" typeface="Microsoft Himalaya"/>
-        <a:font script="Thaa" typeface="MV Boli"/>
-        <a:font script="Deva" typeface="Mangal"/>
-        <a:font script="Telu" typeface="Gautami"/>
-        <a:font script="Taml" typeface="Latha"/>
-        <a:font script="Syrc" typeface="Estrangelo Edessa"/>
-        <a:font script="Orya" typeface="Kalinga"/>
-        <a:font script="Mlym" typeface="Kartika"/>
-        <a:font script="Laoo" typeface="DokChampa"/>
-        <a:font script="Sinh" typeface="Iskoola Pota"/>
-        <a:font script="Mong" typeface="Mongolian Baiti"/>
-        <a:font script="Viet" typeface="Times New Roman"/>
-        <a:font script="Uigh" typeface="Microsoft Uighur"/>
-        <a:font script="Geor" typeface="Sylfaen"/>
-      </a:majorFont>
-      <a:minorFont>
-        <a:latin typeface="Arial"/>
-        <a:ea typeface=""/>
-        <a:cs typeface=""/>
-        <a:font script="Jpan" typeface="ＭＳ Ｐゴシック"/>
-        <a:font script="Hang" typeface="맑은 고딕"/>
-        <a:font script="Hans" typeface="宋体"/>
-        <a:font script="Hant" typeface="新細明體"/>
-        <a:font script="Arab" typeface="Arial"/>
-        <a:font script="Hebr" typeface="Arial"/>
-        <a:font script="Thai" typeface="Cordia New"/>
-        <a:font script="Ethi" typeface="Nyala"/>
-        <a:font script="Beng" typeface="Vrinda"/>
-        <a:font script="Gujr" typeface="Shruti"/>
-        <a:font script="Khmr" typeface="DaunPenh"/>
-        <a:font script="Knda" typeface="Tunga"/>
-        <a:font script="Guru" typeface="Raavi"/>
-        <a:font script="Cans" typeface="Euphemia"/>
-        <a:font script="Cher" typeface="Plantagenet Cherokee"/>
-        <a:font script="Yiii" typeface="Microsoft Yi Baiti"/>
-        <a:font script="Tibt" typeface="Microsoft Himalaya"/>
-        <a:font script="Thaa" typeface="MV Boli"/>
-        <a:font script="Deva" typeface="Mangal"/>
-        <a:font script="Telu" typeface="Gautami"/>
-        <a:font script="Taml" typeface="Latha"/>
-        <a:font script="Syrc" typeface="Estrangelo Edessa"/>
-        <a:font script="Orya" typeface="Kalinga"/>
-        <a:font script="Mlym" typeface="Kartika"/>
-        <a:font script="Laoo" typeface="DokChampa"/>
-        <a:font script="Sinh" typeface="Iskoola Pota"/>
-        <a:font script="Mong" typeface="Mongolian Baiti"/>
-        <a:font script="Viet" typeface="Arial"/>
-        <a:font script="Uigh" typeface="Microsoft Uighur"/>
-        <a:font script="Geor" typeface="Sylfaen"/>
-      </a:minorFont>
-    </a:fontScheme>
-    <a:fmtScheme name="Office">
-      <a:fillStyleLst>
-        <a:solidFill>
-          <a:schemeClr val="phClr"/>
-        </a:solidFill>
-        <a:gradFill rotWithShape="1">
-          <a:gsLst>
-            <a:gs pos="0">
-              <a:schemeClr val="phClr">
-                <a:tint val="50000"/>
-                <a:satMod val="300000"/>
-              </a:schemeClr>
-            </a:gs>
-            <a:gs pos="35000">
-              <a:schemeClr val="phClr">
-                <a:tint val="37000"/>
-                <a:satMod val="300000"/>
-              </a:schemeClr>
-            </a:gs>
-            <a:gs pos="100000">
-              <a:schemeClr val="phClr">
-                <a:tint val="15000"/>
-                <a:satMod val="350000"/>
-              </a:schemeClr>
-            </a:gs>
-          </a:gsLst>
-          <a:lin ang="16200000" scaled="1"/>
-        </a:gradFill>
-        <a:gradFill rotWithShape="1">
-          <a:gsLst>
-            <a:gs pos="0">
-              <a:schemeClr val="phClr">
-                <a:tint val="100000"/>
-                <a:shade val="100000"/>
-                <a:satMod val="130000"/>
-              </a:schemeClr>
-            </a:gs>
-            <a:gs pos="100000">
-              <a:schemeClr val="phClr">
-                <a:tint val="50000"/>
-                <a:shade val="100000"/>
-                <a:satMod val="350000"/>
-              </a:schemeClr>
-            </a:gs>
-          </a:gsLst>
-          <a:lin ang="16200000" scaled="0"/>
-        </a:gradFill>
-      </a:fillStyleLst>
-      <a:lnStyleLst>
-        <a:ln w="9525" cap="flat" cmpd="sng" algn="ctr">
-          <a:solidFill>
-            <a:schemeClr val="phClr">
-              <a:shade val="95000"/>
-              <a:satMod val="105000"/>
-            </a:schemeClr>
-          </a:solidFill>
-          <a:prstDash val="solid"/>
-        </a:ln>
-        <a:ln w="25400" cap="flat" cmpd="sng" algn="ctr">
-          <a:solidFill>
-            <a:schemeClr val="phClr"/>
-          </a:solidFill>
-          <a:prstDash val="solid"/>
-        </a:ln>
-        <a:ln w="38100" cap="flat" cmpd="sng" algn="ctr">
-          <a:solidFill>
-            <a:schemeClr val="phClr"/>
-          </a:solidFill>
-          <a:prstDash val="solid"/>
-        </a:ln>
-      </a:lnStyleLst>
-      <a:effectStyleLst>
-        <a:effectStyle>
-          <a:effectLst>
-            <a:outerShdw blurRad="40000" dist="20000" dir="5400000" rotWithShape="0">
-              <a:srgbClr val="000000">
-                <a:alpha val="38000"/>
-              </a:srgbClr>
-            </a:outerShdw>
-          </a:effectLst>
-        </a:effectStyle>
-        <a:effectStyle>
-          <a:effectLst>
-            <a:outerShdw blurRad="40000" dist="23000" dir="5400000" rotWithShape="0">
-              <a:srgbClr val="000000">
-                <a:alpha val="35000"/>
-              </a:srgbClr>
-            </a:outerShdw>
-          </a:effectLst>
-        </a:effectStyle>
-        <a:effectStyle>
-          <a:effectLst>
-            <a:outerShdw blurRad="40000" dist="23000" dir="5400000" rotWithShape="0">
-              <a:srgbClr val="000000">
-                <a:alpha val="35000"/>
-              </a:srgbClr>
-            </a:outerShdw>
-          </a:effectLst>
-          <a:scene3d>
-            <a:camera prst="orthographicFront">
-              <a:rot lat="0" lon="0" rev="0"/>
-            </a:camera>
-            <a:lightRig rig="threePt" dir="t">
-              <a:rot lat="0" lon="0" rev="1200000"/>
-            </a:lightRig>
-          </a:scene3d>
-          <a:sp3d>
-            <a:bevelT w="63500" h="25400"/>
-          </a:sp3d>
-        </a:effectStyle>
-      </a:effectStyleLst>
-      <a:bgFillStyleLst>
-        <a:solidFill>
-          <a:schemeClr val="phClr"/>
-        </a:solidFill>
-        <a:gradFill rotWithShape="1">
-          <a:gsLst>
-            <a:gs pos="0">
-              <a:schemeClr val="phClr">
-                <a:tint val="40000"/>
-                <a:satMod val="350000"/>
-              </a:schemeClr>
-            </a:gs>
-            <a:gs pos="40000">
-              <a:schemeClr val="phClr">
-                <a:tint val="45000"/>
-                <a:shade val="99000"/>
-                <a:satMod val="350000"/>
-              </a:schemeClr>
-            </a:gs>
-            <a:gs pos="100000">
-              <a:schemeClr val="phClr">
-                <a:shade val="20000"/>
-                <a:satMod val="255000"/>
-              </a:schemeClr>
-            </a:gs>
-          </a:gsLst>
-          <a:path path="circle">
-            <a:fillToRect l="50000" t="-80000" r="50000" b="180000"/>
-          </a:path>
-        </a:gradFill>
-        <a:gradFill rotWithShape="1">
-          <a:gsLst>
-            <a:gs pos="0">
-              <a:schemeClr val="phClr">
-                <a:tint val="80000"/>
-                <a:satMod val="300000"/>
-              </a:schemeClr>
-            </a:gs>
-            <a:gs pos="100000">
-              <a:schemeClr val="phClr">
-                <a:shade val="30000"/>
-                <a:satMod val="200000"/>
-              </a:schemeClr>
-            </a:gs>
-          </a:gsLst>
-          <a:path path="circle">
-            <a:fillToRect l="50000" t="50000" r="50000" b="50000"/>
-          </a:path>
-        </a:gradFill>
-      </a:bgFillStyleLst>
-    </a:fmtScheme>
-  </a:themeElements>
-</a:theme>
 </file>
</xml_diff>